<commit_message>
Practice run of talk
</commit_message>
<xml_diff>
--- a/Presentations/NUCLEI_June2021/tropiano_nuclei_june2021.pptx
+++ b/Presentations/NUCLEI_June2021/tropiano_nuclei_june2021.pptx
@@ -836,7 +836,7 @@
           <a:p>
             <a:fld id="{D6262846-A322-4A91-AADC-BD2991192A7F}" type="datetimeFigureOut">
               <a:rPr lang="en-US" smtClean="0"/>
-              <a:t>5/31/2021</a:t>
+              <a:t>5/31/21</a:t>
             </a:fld>
             <a:endParaRPr lang="en-US"/>
           </a:p>
@@ -2918,7 +2918,16 @@
           <a:bodyPr/>
           <a:lstStyle/>
           <a:p>
-            <a:endParaRPr lang="en-US" dirty="0"/>
+            <a:r>
+              <a:rPr lang="en-US" dirty="0"/>
+              <a:t>Add unitarity from SRG evolution here</a:t>
+            </a:r>
+          </a:p>
+          <a:p>
+            <a:r>
+              <a:rPr lang="en-US" dirty="0"/>
+              <a:t>Maybe define \lambda?</a:t>
+            </a:r>
           </a:p>
         </p:txBody>
       </p:sp>
@@ -3333,7 +3342,7 @@
           <a:p>
             <a:fld id="{FC1FED04-388D-410A-A665-E14242DC85E6}" type="datetime1">
               <a:rPr lang="en-US" smtClean="0"/>
-              <a:t>5/31/2021</a:t>
+              <a:t>5/31/21</a:t>
             </a:fld>
             <a:endParaRPr lang="en-US"/>
           </a:p>
@@ -3534,7 +3543,7 @@
           <a:p>
             <a:fld id="{856B85E3-FDD3-4A3F-8763-C265F3DB4E3D}" type="datetime1">
               <a:rPr lang="en-US" smtClean="0"/>
-              <a:t>5/31/2021</a:t>
+              <a:t>5/31/21</a:t>
             </a:fld>
             <a:endParaRPr lang="en-US"/>
           </a:p>
@@ -3745,7 +3754,7 @@
           <a:p>
             <a:fld id="{722A66D8-8E7A-4E22-BBC1-BC659DD3C778}" type="datetime1">
               <a:rPr lang="en-US" smtClean="0"/>
-              <a:t>5/31/2021</a:t>
+              <a:t>5/31/21</a:t>
             </a:fld>
             <a:endParaRPr lang="en-US"/>
           </a:p>
@@ -3968,7 +3977,7 @@
           <a:p>
             <a:fld id="{A6AD216D-7D59-4A7F-B917-368A6AA771D1}" type="datetime1">
               <a:rPr lang="en-US" smtClean="0"/>
-              <a:t>5/31/2021</a:t>
+              <a:t>5/31/21</a:t>
             </a:fld>
             <a:endParaRPr lang="en-US"/>
           </a:p>
@@ -4169,7 +4178,7 @@
           <a:p>
             <a:fld id="{A303DA1B-F999-4E69-99FA-1CE3772F5BA5}" type="datetime1">
               <a:rPr lang="en-US" smtClean="0"/>
-              <a:t>5/31/2021</a:t>
+              <a:t>5/31/21</a:t>
             </a:fld>
             <a:endParaRPr lang="en-US"/>
           </a:p>
@@ -4447,7 +4456,7 @@
           <a:p>
             <a:fld id="{BC6C999D-E676-4E45-9175-E80BE730AFA4}" type="datetime1">
               <a:rPr lang="en-US" smtClean="0"/>
-              <a:t>5/31/2021</a:t>
+              <a:t>5/31/21</a:t>
             </a:fld>
             <a:endParaRPr lang="en-US"/>
           </a:p>
@@ -4715,7 +4724,7 @@
           <a:p>
             <a:fld id="{23A1BCF4-86ED-40A1-86A7-32B5D50E9F93}" type="datetime1">
               <a:rPr lang="en-US" smtClean="0"/>
-              <a:t>5/31/2021</a:t>
+              <a:t>5/31/21</a:t>
             </a:fld>
             <a:endParaRPr lang="en-US"/>
           </a:p>
@@ -5130,7 +5139,7 @@
           <a:p>
             <a:fld id="{A9F9FAEC-7120-4131-91B0-7600C665D34A}" type="datetime1">
               <a:rPr lang="en-US" smtClean="0"/>
-              <a:t>5/31/2021</a:t>
+              <a:t>5/31/21</a:t>
             </a:fld>
             <a:endParaRPr lang="en-US"/>
           </a:p>
@@ -5274,7 +5283,7 @@
           <a:p>
             <a:fld id="{B247B85E-64B9-43BE-AE29-B422BBA0E858}" type="datetime1">
               <a:rPr lang="en-US" smtClean="0"/>
-              <a:t>5/31/2021</a:t>
+              <a:t>5/31/21</a:t>
             </a:fld>
             <a:endParaRPr lang="en-US"/>
           </a:p>
@@ -5390,7 +5399,7 @@
           <a:p>
             <a:fld id="{1B611B8C-FD49-4646-9FB0-3CB2922F548E}" type="datetime1">
               <a:rPr lang="en-US" smtClean="0"/>
-              <a:t>5/31/2021</a:t>
+              <a:t>5/31/21</a:t>
             </a:fld>
             <a:endParaRPr lang="en-US"/>
           </a:p>
@@ -5704,7 +5713,7 @@
           <a:p>
             <a:fld id="{89325260-0D0F-4914-839B-D20472212676}" type="datetime1">
               <a:rPr lang="en-US" smtClean="0"/>
-              <a:t>5/31/2021</a:t>
+              <a:t>5/31/21</a:t>
             </a:fld>
             <a:endParaRPr lang="en-US"/>
           </a:p>
@@ -5905,7 +5914,7 @@
           <a:p>
             <a:fld id="{9CC3B546-0499-42FA-9D44-8F6B08AE3C90}" type="datetime1">
               <a:rPr lang="en-US" smtClean="0"/>
-              <a:t>5/31/2021</a:t>
+              <a:t>5/31/21</a:t>
             </a:fld>
             <a:endParaRPr lang="en-US"/>
           </a:p>
@@ -6199,7 +6208,7 @@
           <a:p>
             <a:fld id="{B81812BE-3472-47F2-BF26-18685A7C56F6}" type="datetime1">
               <a:rPr lang="en-US" smtClean="0"/>
-              <a:t>5/31/2021</a:t>
+              <a:t>5/31/21</a:t>
             </a:fld>
             <a:endParaRPr lang="en-US"/>
           </a:p>
@@ -6400,7 +6409,7 @@
           <a:p>
             <a:fld id="{18A87C95-A9A9-4012-BBE3-9041C38DF315}" type="datetime1">
               <a:rPr lang="en-US" smtClean="0"/>
-              <a:t>5/31/2021</a:t>
+              <a:t>5/31/21</a:t>
             </a:fld>
             <a:endParaRPr lang="en-US"/>
           </a:p>
@@ -6611,7 +6620,7 @@
           <a:p>
             <a:fld id="{6F2349E6-156D-4BA7-9DD6-6FA82AD0779F}" type="datetime1">
               <a:rPr lang="en-US" smtClean="0"/>
-              <a:t>5/31/2021</a:t>
+              <a:t>5/31/21</a:t>
             </a:fld>
             <a:endParaRPr lang="en-US"/>
           </a:p>
@@ -6889,7 +6898,7 @@
           <a:p>
             <a:fld id="{7A0AF4C6-962C-4BD3-B281-8FC47A57A83D}" type="datetime1">
               <a:rPr lang="en-US" smtClean="0"/>
-              <a:t>5/31/2021</a:t>
+              <a:t>5/31/21</a:t>
             </a:fld>
             <a:endParaRPr lang="en-US"/>
           </a:p>
@@ -7157,7 +7166,7 @@
           <a:p>
             <a:fld id="{04EF960B-D9C1-4F1C-8EA6-D052E7F487B2}" type="datetime1">
               <a:rPr lang="en-US" smtClean="0"/>
-              <a:t>5/31/2021</a:t>
+              <a:t>5/31/21</a:t>
             </a:fld>
             <a:endParaRPr lang="en-US"/>
           </a:p>
@@ -7572,7 +7581,7 @@
           <a:p>
             <a:fld id="{D71C6406-26D4-468E-93D2-CE85D1EDF798}" type="datetime1">
               <a:rPr lang="en-US" smtClean="0"/>
-              <a:t>5/31/2021</a:t>
+              <a:t>5/31/21</a:t>
             </a:fld>
             <a:endParaRPr lang="en-US"/>
           </a:p>
@@ -7716,7 +7725,7 @@
           <a:p>
             <a:fld id="{9D412F2F-3F11-4A6C-A0F0-FD7A21F242EC}" type="datetime1">
               <a:rPr lang="en-US" smtClean="0"/>
-              <a:t>5/31/2021</a:t>
+              <a:t>5/31/21</a:t>
             </a:fld>
             <a:endParaRPr lang="en-US"/>
           </a:p>
@@ -7832,7 +7841,7 @@
           <a:p>
             <a:fld id="{8CBFE044-556D-4073-8297-E5E2436291C0}" type="datetime1">
               <a:rPr lang="en-US" smtClean="0"/>
-              <a:t>5/31/2021</a:t>
+              <a:t>5/31/21</a:t>
             </a:fld>
             <a:endParaRPr lang="en-US"/>
           </a:p>
@@ -8146,7 +8155,7 @@
           <a:p>
             <a:fld id="{AFC46207-BCE1-44EF-A79B-771210D6A754}" type="datetime1">
               <a:rPr lang="en-US" smtClean="0"/>
-              <a:t>5/31/2021</a:t>
+              <a:t>5/31/21</a:t>
             </a:fld>
             <a:endParaRPr lang="en-US"/>
           </a:p>
@@ -8440,7 +8449,7 @@
           <a:p>
             <a:fld id="{269C1E1C-AC9E-42BA-B7CA-59A587E3E00F}" type="datetime1">
               <a:rPr lang="en-US" smtClean="0"/>
-              <a:t>5/31/2021</a:t>
+              <a:t>5/31/21</a:t>
             </a:fld>
             <a:endParaRPr lang="en-US"/>
           </a:p>
@@ -8687,7 +8696,7 @@
           <a:p>
             <a:fld id="{63CF8C20-61BB-4A3E-B590-FA17A677BF79}" type="datetime1">
               <a:rPr lang="en-US" smtClean="0"/>
-              <a:t>5/31/2021</a:t>
+              <a:t>5/31/21</a:t>
             </a:fld>
             <a:endParaRPr lang="en-US" dirty="0"/>
           </a:p>
@@ -9266,7 +9275,7 @@
           <a:p>
             <a:fld id="{16B6F2F9-C607-4720-87F9-6AD1246ADE76}" type="datetime1">
               <a:rPr lang="en-US" smtClean="0"/>
-              <a:t>5/31/2021</a:t>
+              <a:t>5/31/21</a:t>
             </a:fld>
             <a:endParaRPr lang="en-US" dirty="0"/>
           </a:p>
@@ -24817,8 +24826,8 @@
           </a:p>
         </p:txBody>
       </p:sp>
-      <mc:AlternateContent xmlns:mc="http://schemas.openxmlformats.org/markup-compatibility/2006">
-        <mc:Choice xmlns:a14="http://schemas.microsoft.com/office/drawing/2010/main" Requires="a14">
+      <mc:AlternateContent xmlns:mc="http://schemas.openxmlformats.org/markup-compatibility/2006" xmlns:a14="http://schemas.microsoft.com/office/drawing/2010/main">
+        <mc:Choice Requires="a14">
           <p:sp>
             <p:nvSpPr>
               <p:cNvPr id="16" name="TextBox 15">
@@ -24962,7 +24971,7 @@
             </p:txBody>
           </p:sp>
         </mc:Choice>
-        <mc:Fallback>
+        <mc:Fallback xmlns="">
           <p:sp>
             <p:nvSpPr>
               <p:cNvPr id="16" name="TextBox 15">
@@ -28416,8 +28425,8 @@
           </p:sp>
         </mc:Fallback>
       </mc:AlternateContent>
-      <mc:AlternateContent xmlns:mc="http://schemas.openxmlformats.org/markup-compatibility/2006">
-        <mc:Choice xmlns:a14="http://schemas.microsoft.com/office/drawing/2010/main" Requires="a14">
+      <mc:AlternateContent xmlns:mc="http://schemas.openxmlformats.org/markup-compatibility/2006" xmlns:a14="http://schemas.microsoft.com/office/drawing/2010/main">
+        <mc:Choice Requires="a14">
           <p:sp>
             <p:nvSpPr>
               <p:cNvPr id="3" name="TextBox 2">
@@ -28759,7 +28768,7 @@
             </p:txBody>
           </p:sp>
         </mc:Choice>
-        <mc:Fallback>
+        <mc:Fallback xmlns="">
           <p:sp>
             <p:nvSpPr>
               <p:cNvPr id="3" name="TextBox 2">
@@ -30172,8 +30181,8 @@
           </a:p>
         </p:txBody>
       </p:sp>
-      <mc:AlternateContent xmlns:mc="http://schemas.openxmlformats.org/markup-compatibility/2006">
-        <mc:Choice xmlns:a14="http://schemas.microsoft.com/office/drawing/2010/main" Requires="a14">
+      <mc:AlternateContent xmlns:mc="http://schemas.openxmlformats.org/markup-compatibility/2006" xmlns:a14="http://schemas.microsoft.com/office/drawing/2010/main">
+        <mc:Choice Requires="a14">
           <p:sp>
             <p:nvSpPr>
               <p:cNvPr id="3" name="Content Placeholder 2">
@@ -30351,7 +30360,7 @@
             </p:txBody>
           </p:sp>
         </mc:Choice>
-        <mc:Fallback>
+        <mc:Fallback xmlns="">
           <p:sp>
             <p:nvSpPr>
               <p:cNvPr id="3" name="Content Placeholder 2">
@@ -30960,8 +30969,8 @@
           </a:p>
         </p:txBody>
       </p:sp>
-      <mc:AlternateContent xmlns:mc="http://schemas.openxmlformats.org/markup-compatibility/2006">
-        <mc:Choice xmlns:a14="http://schemas.microsoft.com/office/drawing/2010/main" Requires="a14">
+      <mc:AlternateContent xmlns:mc="http://schemas.openxmlformats.org/markup-compatibility/2006" xmlns:a14="http://schemas.microsoft.com/office/drawing/2010/main">
+        <mc:Choice Requires="a14">
           <p:sp>
             <p:nvSpPr>
               <p:cNvPr id="3" name="Content Placeholder 2">
@@ -31734,7 +31743,7 @@
             </p:txBody>
           </p:sp>
         </mc:Choice>
-        <mc:Fallback>
+        <mc:Fallback xmlns="">
           <p:sp>
             <p:nvSpPr>
               <p:cNvPr id="3" name="Content Placeholder 2">

</xml_diff>

<commit_message>
Updates to NUCLEI talk
</commit_message>
<xml_diff>
--- a/Presentations/NUCLEI_June2021/tropiano_nuclei_june2021.pptx
+++ b/Presentations/NUCLEI_June2021/tropiano_nuclei_june2021.pptx
@@ -1651,6 +1651,12 @@
               <a:t>Furthermore, this factorizes so we are left with the high-momentum dependence out in front here (point) and the rest is at low momentum.</a:t>
             </a:r>
           </a:p>
+          <a:p>
+            <a:r>
+              <a:rPr lang="en-US" dirty="0"/>
+              <a:t>Factorization from OPE.</a:t>
+            </a:r>
+          </a:p>
         </p:txBody>
       </p:sp>
       <p:sp>
@@ -1909,7 +1915,19 @@
           <a:p>
             <a:r>
               <a:rPr lang="en-US" dirty="0"/>
-              <a:t>Compare to AV18 QMC calculations, read bullets.</a:t>
+              <a:t>Compare to AV18 QMC calculations, read bullets, emphasize that the high-q tail works well.</a:t>
+            </a:r>
+          </a:p>
+          <a:p>
+            <a:r>
+              <a:rPr lang="en-US" dirty="0"/>
+              <a:t>Why is the intermediate q region the worst? Operator cut at 2-body and WF is just HF. (IMSRG decoupling example).</a:t>
+            </a:r>
+          </a:p>
+          <a:p>
+            <a:r>
+              <a:rPr lang="en-US" dirty="0"/>
+              <a:t>Why isn’t low-q showing? Low-q corresponds to large-r in LDA where a local density approximation will not work.</a:t>
             </a:r>
           </a:p>
         </p:txBody>
@@ -2455,6 +2473,33 @@
               <a:rPr lang="en-US" dirty="0"/>
               <a:t>Lastly, we can produce SRC scale factors using this expression here (explain). Gives good agreement with experiment and LCA calculations from this reference (point).</a:t>
             </a:r>
+          </a:p>
+          <a:p>
+            <a:r>
+              <a:rPr lang="en-US" dirty="0"/>
+              <a:t>a2 is given by the ratio of \</a:t>
+            </a:r>
+            <a:r>
+              <a:rPr lang="en-US" dirty="0" err="1"/>
+              <a:t>sigma^A</a:t>
+            </a:r>
+            <a:r>
+              <a:rPr lang="en-US" dirty="0"/>
+              <a:t> / \</a:t>
+            </a:r>
+            <a:r>
+              <a:rPr lang="en-US" dirty="0" err="1"/>
+              <a:t>sigma^d</a:t>
+            </a:r>
+            <a:r>
+              <a:rPr lang="en-US" dirty="0"/>
+              <a:t> inclusive cross section ratios which plateau at </a:t>
+            </a:r>
+            <a:r>
+              <a:rPr lang="en-US"/>
+              <a:t>high Bjorken x.</a:t>
+            </a:r>
+            <a:endParaRPr lang="en-US" dirty="0"/>
           </a:p>
         </p:txBody>
       </p:sp>
@@ -10025,6 +10070,20 @@
                 <a:ea typeface="Arial Unicode MS" panose="020B0604020202020204" pitchFamily="34" charset="-128"/>
                 <a:cs typeface="Arial" panose="020B0604020202020204" pitchFamily="34" charset="0"/>
               </a:rPr>
+              <a:t>, Scott Bogner</a:t>
+            </a:r>
+            <a:r>
+              <a:rPr lang="en-US" altLang="en-US" sz="2200" baseline="30000" dirty="0">
+                <a:ea typeface="Arial Unicode MS" panose="020B0604020202020204" pitchFamily="34" charset="-128"/>
+                <a:cs typeface="Arial" panose="020B0604020202020204" pitchFamily="34" charset="0"/>
+              </a:rPr>
+              <a:t>2</a:t>
+            </a:r>
+            <a:r>
+              <a:rPr lang="en-US" altLang="en-US" sz="2200" dirty="0">
+                <a:ea typeface="Arial Unicode MS" panose="020B0604020202020204" pitchFamily="34" charset="-128"/>
+                <a:cs typeface="Arial" panose="020B0604020202020204" pitchFamily="34" charset="0"/>
+              </a:rPr>
               <a:t>, Dick Furnstahl</a:t>
             </a:r>
             <a:r>
@@ -10034,20 +10093,10 @@
               </a:rPr>
               <a:t>1</a:t>
             </a:r>
-            <a:r>
-              <a:rPr lang="en-US" altLang="en-US" sz="2200" dirty="0">
-                <a:ea typeface="Arial Unicode MS" panose="020B0604020202020204" pitchFamily="34" charset="-128"/>
-                <a:cs typeface="Arial" panose="020B0604020202020204" pitchFamily="34" charset="0"/>
-              </a:rPr>
-              <a:t>, Scott Bogner</a:t>
-            </a:r>
-            <a:r>
-              <a:rPr lang="en-US" altLang="en-US" sz="2200" baseline="30000" dirty="0">
-                <a:ea typeface="Arial Unicode MS" panose="020B0604020202020204" pitchFamily="34" charset="-128"/>
-                <a:cs typeface="Arial" panose="020B0604020202020204" pitchFamily="34" charset="0"/>
-              </a:rPr>
-              <a:t>2</a:t>
-            </a:r>
+            <a:endParaRPr lang="en-US" altLang="en-US" sz="2200" dirty="0">
+              <a:ea typeface="Arial Unicode MS" panose="020B0604020202020204" pitchFamily="34" charset="-128"/>
+              <a:cs typeface="Arial" panose="020B0604020202020204" pitchFamily="34" charset="0"/>
+            </a:endParaRPr>
           </a:p>
           <a:p>
             <a:pPr>
@@ -21874,8 +21923,8 @@
           </a:p>
         </p:txBody>
       </p:sp>
-      <mc:AlternateContent xmlns:mc="http://schemas.openxmlformats.org/markup-compatibility/2006" xmlns:a14="http://schemas.microsoft.com/office/drawing/2010/main">
-        <mc:Choice Requires="a14">
+      <mc:AlternateContent xmlns:mc="http://schemas.openxmlformats.org/markup-compatibility/2006">
+        <mc:Choice xmlns:a14="http://schemas.microsoft.com/office/drawing/2010/main" Requires="a14">
           <p:sp>
             <p:nvSpPr>
               <p:cNvPr id="3" name="Content Placeholder 2">
@@ -21894,8 +21943,8 @@
             </p:nvSpPr>
             <p:spPr>
               <a:xfrm>
-                <a:off x="522302" y="1690688"/>
-                <a:ext cx="6251360" cy="4351338"/>
+                <a:off x="320421" y="1690688"/>
+                <a:ext cx="6341636" cy="4351338"/>
               </a:xfrm>
             </p:spPr>
             <p:txBody>
@@ -22098,10 +22147,21 @@
                   <a:t> fixed by 2-body</a:t>
                 </a:r>
               </a:p>
+              <a:p>
+                <a:pPr lvl="1">
+                  <a:lnSpc>
+                    <a:spcPct val="100000"/>
+                  </a:lnSpc>
+                </a:pPr>
+                <a:r>
+                  <a:rPr lang="en-US" dirty="0"/>
+                  <a:t>Results are insensitive to type of density</a:t>
+                </a:r>
+              </a:p>
             </p:txBody>
           </p:sp>
         </mc:Choice>
-        <mc:Fallback xmlns="">
+        <mc:Fallback>
           <p:sp>
             <p:nvSpPr>
               <p:cNvPr id="3" name="Content Placeholder 2">
@@ -22120,13 +22180,13 @@
             </p:nvSpPr>
             <p:spPr>
               <a:xfrm>
-                <a:off x="522302" y="1690688"/>
-                <a:ext cx="6251360" cy="4351338"/>
+                <a:off x="320421" y="1690688"/>
+                <a:ext cx="6341636" cy="4351338"/>
               </a:xfrm>
               <a:blipFill>
                 <a:blip r:embed="rId4"/>
                 <a:stretch>
-                  <a:fillRect l="-1826" t="-1163"/>
+                  <a:fillRect l="-1800" t="-1163" r="-1000"/>
                 </a:stretch>
               </a:blipFill>
             </p:spPr>
@@ -22266,8 +22326,8 @@
           </a:p>
         </p:txBody>
       </p:sp>
-      <mc:AlternateContent xmlns:mc="http://schemas.openxmlformats.org/markup-compatibility/2006" xmlns:a14="http://schemas.microsoft.com/office/drawing/2010/main">
-        <mc:Choice Requires="a14">
+      <mc:AlternateContent xmlns:mc="http://schemas.openxmlformats.org/markup-compatibility/2006">
+        <mc:Choice xmlns:a14="http://schemas.microsoft.com/office/drawing/2010/main" Requires="a14">
           <p:sp>
             <p:nvSpPr>
               <p:cNvPr id="8" name="TextBox 7">
@@ -22377,7 +22437,7 @@
                     <a:latin typeface="Arial" panose="020B0604020202020204" pitchFamily="34" charset="0"/>
                     <a:cs typeface="Arial" panose="020B0604020202020204" pitchFamily="34" charset="0"/>
                   </a:rPr>
-                  <a:t> potential SLy4 using the HFBRAD code</a:t>
+                  <a:t> EDF SLy4 using the HFBRAD code</a:t>
                 </a:r>
                 <a:r>
                   <a:rPr lang="en-US" sz="1600" baseline="30000" dirty="0">
@@ -22397,7 +22457,7 @@
             </p:txBody>
           </p:sp>
         </mc:Choice>
-        <mc:Fallback xmlns="">
+        <mc:Fallback>
           <p:sp>
             <p:nvSpPr>
               <p:cNvPr id="8" name="TextBox 7">
@@ -24955,8 +25015,8 @@
           </p:sp>
         </mc:Fallback>
       </mc:AlternateContent>
-      <mc:AlternateContent xmlns:mc="http://schemas.openxmlformats.org/markup-compatibility/2006">
-        <mc:Choice xmlns:a14="http://schemas.microsoft.com/office/drawing/2010/main" Requires="a14">
+      <mc:AlternateContent xmlns:mc="http://schemas.openxmlformats.org/markup-compatibility/2006" xmlns:a14="http://schemas.microsoft.com/office/drawing/2010/main">
+        <mc:Choice Requires="a14">
           <p:sp>
             <p:nvSpPr>
               <p:cNvPr id="3" name="TextBox 2">
@@ -25240,7 +25300,7 @@
             </p:txBody>
           </p:sp>
         </mc:Choice>
-        <mc:Fallback>
+        <mc:Fallback xmlns="">
           <p:sp>
             <p:nvSpPr>
               <p:cNvPr id="3" name="TextBox 2">
@@ -28955,8 +29015,8 @@
           </a:p>
         </p:txBody>
       </p:sp>
-      <mc:AlternateContent xmlns:mc="http://schemas.openxmlformats.org/markup-compatibility/2006" xmlns:a14="http://schemas.microsoft.com/office/drawing/2010/main">
-        <mc:Choice Requires="a14">
+      <mc:AlternateContent xmlns:mc="http://schemas.openxmlformats.org/markup-compatibility/2006">
+        <mc:Choice xmlns:a14="http://schemas.microsoft.com/office/drawing/2010/main" Requires="a14">
           <p:sp>
             <p:nvSpPr>
               <p:cNvPr id="3" name="Content Placeholder 2">
@@ -29707,7 +29767,40 @@
                 </a:pPr>
                 <a:r>
                   <a:rPr lang="en-US" sz="2400" dirty="0"/>
-                  <a:t>Good agreement with experiment</a:t>
+                  <a:t>Good agreement with </a:t>
+                </a:r>
+                <a14:m>
+                  <m:oMath xmlns:m="http://schemas.openxmlformats.org/officeDocument/2006/math">
+                    <m:sSub>
+                      <m:sSubPr>
+                        <m:ctrlPr>
+                          <a:rPr lang="en-US" sz="2400" i="1" smtClean="0">
+                            <a:latin typeface="Cambria Math" panose="02040503050406030204" pitchFamily="18" charset="0"/>
+                          </a:rPr>
+                        </m:ctrlPr>
+                      </m:sSubPr>
+                      <m:e>
+                        <m:r>
+                          <a:rPr lang="en-US" sz="2400" b="0" i="1" smtClean="0">
+                            <a:latin typeface="Cambria Math" panose="02040503050406030204" pitchFamily="18" charset="0"/>
+                          </a:rPr>
+                          <m:t>𝑎</m:t>
+                        </m:r>
+                      </m:e>
+                      <m:sub>
+                        <m:r>
+                          <a:rPr lang="en-US" sz="2400" b="0" i="1" smtClean="0">
+                            <a:latin typeface="Cambria Math" panose="02040503050406030204" pitchFamily="18" charset="0"/>
+                          </a:rPr>
+                          <m:t>2</m:t>
+                        </m:r>
+                      </m:sub>
+                    </m:sSub>
+                  </m:oMath>
+                </a14:m>
+                <a:r>
+                  <a:rPr lang="en-US" sz="2400" dirty="0"/>
+                  <a:t> values from experiment</a:t>
                 </a:r>
                 <a:r>
                   <a:rPr lang="en-US" sz="2400" baseline="30000" dirty="0"/>
@@ -29729,7 +29822,7 @@
             </p:txBody>
           </p:sp>
         </mc:Choice>
-        <mc:Fallback xmlns="">
+        <mc:Fallback>
           <p:sp>
             <p:nvSpPr>
               <p:cNvPr id="3" name="Content Placeholder 2">
@@ -29754,7 +29847,7 @@
               <a:blipFill>
                 <a:blip r:embed="rId4"/>
                 <a:stretch>
-                  <a:fillRect l="-1299" t="-980"/>
+                  <a:fillRect l="-1245" t="-2332"/>
                 </a:stretch>
               </a:blipFill>
             </p:spPr>
@@ -30424,11 +30517,17 @@
               <a:rPr lang="en-US" sz="2200" dirty="0"/>
               <a:t>Apply to more complicated knock-out reactions (SRG with optical potentials)</a:t>
             </a:r>
-            <a:endParaRPr lang="en-US" sz="2200" dirty="0">
-              <a:solidFill>
-                <a:srgbClr val="C00000"/>
-              </a:solidFill>
-            </a:endParaRPr>
+          </a:p>
+          <a:p>
+            <a:pPr lvl="1">
+              <a:lnSpc>
+                <a:spcPct val="100000"/>
+              </a:lnSpc>
+            </a:pPr>
+            <a:r>
+              <a:rPr lang="en-US" sz="2200" dirty="0"/>
+              <a:t>Implement uncertainty quantification</a:t>
+            </a:r>
           </a:p>
         </p:txBody>
       </p:sp>
@@ -35478,8 +35577,8 @@
           </a:p>
         </p:txBody>
       </p:sp>
-      <mc:AlternateContent xmlns:mc="http://schemas.openxmlformats.org/markup-compatibility/2006">
-        <mc:Choice xmlns:a14="http://schemas.microsoft.com/office/drawing/2010/main" Requires="a14">
+      <mc:AlternateContent xmlns:mc="http://schemas.openxmlformats.org/markup-compatibility/2006" xmlns:a14="http://schemas.microsoft.com/office/drawing/2010/main">
+        <mc:Choice Requires="a14">
           <p:sp>
             <p:nvSpPr>
               <p:cNvPr id="3" name="Content Placeholder 2">
@@ -35577,7 +35676,7 @@
             </p:txBody>
           </p:sp>
         </mc:Choice>
-        <mc:Fallback>
+        <mc:Fallback xmlns="">
           <p:sp>
             <p:nvSpPr>
               <p:cNvPr id="3" name="Content Placeholder 2">

</xml_diff>